<commit_message>
add extra slide for pipelines
</commit_message>
<xml_diff>
--- a/How to decouple your code.pptx
+++ b/How to decouple your code.pptx
@@ -5,7 +5,7 @@
     <p:sldMasterId id="2147483712" r:id="rId4"/>
   </p:sldMasterIdLst>
   <p:notesMasterIdLst>
-    <p:notesMasterId r:id="rId21"/>
+    <p:notesMasterId r:id="rId22"/>
   </p:notesMasterIdLst>
   <p:sldIdLst>
     <p:sldId id="257" r:id="rId5"/>
@@ -21,9 +21,10 @@
     <p:sldId id="272" r:id="rId15"/>
     <p:sldId id="271" r:id="rId16"/>
     <p:sldId id="262" r:id="rId17"/>
-    <p:sldId id="276" r:id="rId18"/>
-    <p:sldId id="277" r:id="rId19"/>
-    <p:sldId id="270" r:id="rId20"/>
+    <p:sldId id="278" r:id="rId18"/>
+    <p:sldId id="276" r:id="rId19"/>
+    <p:sldId id="277" r:id="rId20"/>
+    <p:sldId id="270" r:id="rId21"/>
   </p:sldIdLst>
   <p:sldSz cx="12192000" cy="6858000"/>
   <p:notesSz cx="6858000" cy="9144000"/>
@@ -881,22 +882,7 @@
           <a:bodyPr/>
           <a:lstStyle/>
           <a:p>
-            <a:r>
-              <a:rPr lang="en-US" dirty="0"/>
-              <a:t>- the speed impact is negligible in most of the cases when looking at a real world API</a:t>
-            </a:r>
-          </a:p>
-          <a:p>
-            <a:r>
-              <a:rPr lang="en-US" dirty="0"/>
-              <a:t>- the higher memory consumption is more impactful in a highly memory restricted scenario as it causes more often GC</a:t>
-            </a:r>
-          </a:p>
-          <a:p>
-            <a:r>
-              <a:rPr lang="en-US" dirty="0"/>
-              <a:t> – like inside a Kubernetes pod, but still negligible in my opinion</a:t>
-            </a:r>
+            <a:endParaRPr lang="en-US" dirty="0"/>
           </a:p>
         </p:txBody>
       </p:sp>
@@ -926,7 +912,7 @@
     </p:spTree>
     <p:extLst>
       <p:ext uri="{BB962C8B-B14F-4D97-AF65-F5344CB8AC3E}">
-        <p14:creationId xmlns:p14="http://schemas.microsoft.com/office/powerpoint/2010/main" val="4006947244"/>
+        <p14:creationId xmlns:p14="http://schemas.microsoft.com/office/powerpoint/2010/main" val="1999791494"/>
       </p:ext>
     </p:extLst>
   </p:cSld>
@@ -982,49 +968,19 @@
           <a:p>
             <a:r>
               <a:rPr lang="en-US" dirty="0"/>
-              <a:t>- did you ever had to add a common functionality between a set of endpoints?</a:t>
+              <a:t>- the speed impact is negligible in most of the cases when looking at a real world API</a:t>
             </a:r>
           </a:p>
           <a:p>
             <a:r>
               <a:rPr lang="en-US" dirty="0"/>
-              <a:t>- </a:t>
-            </a:r>
-            <a:r>
-              <a:rPr lang="en-US" dirty="0" err="1"/>
-              <a:t>.net</a:t>
-            </a:r>
+              <a:t>- the higher memory consumption is more impactful in a highly memory restricted scenario as it causes more often GC</a:t>
+            </a:r>
+          </a:p>
+          <a:p>
             <a:r>
               <a:rPr lang="en-US" dirty="0"/>
-              <a:t> </a:t>
-            </a:r>
-            <a:r>
-              <a:rPr lang="en-US" dirty="0" err="1"/>
-              <a:t>middlewares</a:t>
-            </a:r>
-            <a:r>
-              <a:rPr lang="en-US" dirty="0"/>
-              <a:t> </a:t>
-            </a:r>
-          </a:p>
-          <a:p>
-            <a:r>
-              <a:rPr lang="en-US" dirty="0"/>
-              <a:t>- or decorator design pattern </a:t>
-            </a:r>
-          </a:p>
-          <a:p>
-            <a:r>
-              <a:rPr lang="en-US" dirty="0"/>
-              <a:t>- logging, gathering metrics, validation, </a:t>
-            </a:r>
-            <a:r>
-              <a:rPr lang="en-US" dirty="0" err="1"/>
-              <a:t>cacheing</a:t>
-            </a:r>
-            <a:r>
-              <a:rPr lang="en-US" dirty="0"/>
-              <a:t>?</a:t>
+              <a:t> – like inside a Kubernetes pod, but still negligible in my opinion</a:t>
             </a:r>
           </a:p>
         </p:txBody>
@@ -1047,6 +1003,135 @@
             <a:fld id="{50B2E8CF-7912-5344-9B14-D40B44999E4E}" type="slidenum">
               <a:rPr lang="en-US" smtClean="0"/>
               <a:t>15</a:t>
+            </a:fld>
+            <a:endParaRPr lang="en-US"/>
+          </a:p>
+        </p:txBody>
+      </p:sp>
+    </p:spTree>
+    <p:extLst>
+      <p:ext uri="{BB962C8B-B14F-4D97-AF65-F5344CB8AC3E}">
+        <p14:creationId xmlns:p14="http://schemas.microsoft.com/office/powerpoint/2010/main" val="4006947244"/>
+      </p:ext>
+    </p:extLst>
+  </p:cSld>
+  <p:clrMapOvr>
+    <a:masterClrMapping/>
+  </p:clrMapOvr>
+</p:notes>
+</file>
+
+<file path=ppt/notesSlides/notesSlide12.xml><?xml version="1.0" encoding="utf-8"?>
+<p:notes xmlns:a="http://schemas.openxmlformats.org/drawingml/2006/main" xmlns:r="http://schemas.openxmlformats.org/officeDocument/2006/relationships" xmlns:p="http://schemas.openxmlformats.org/presentationml/2006/main">
+  <p:cSld>
+    <p:spTree>
+      <p:nvGrpSpPr>
+        <p:cNvPr id="1" name=""/>
+        <p:cNvGrpSpPr/>
+        <p:nvPr/>
+      </p:nvGrpSpPr>
+      <p:grpSpPr>
+        <a:xfrm>
+          <a:off x="0" y="0"/>
+          <a:ext cx="0" cy="0"/>
+          <a:chOff x="0" y="0"/>
+          <a:chExt cx="0" cy="0"/>
+        </a:xfrm>
+      </p:grpSpPr>
+      <p:sp>
+        <p:nvSpPr>
+          <p:cNvPr id="2" name="Slide Image Placeholder 1"/>
+          <p:cNvSpPr>
+            <a:spLocks noGrp="1" noRot="1" noChangeAspect="1"/>
+          </p:cNvSpPr>
+          <p:nvPr>
+            <p:ph type="sldImg"/>
+          </p:nvPr>
+        </p:nvSpPr>
+        <p:spPr/>
+      </p:sp>
+      <p:sp>
+        <p:nvSpPr>
+          <p:cNvPr id="3" name="Notes Placeholder 2"/>
+          <p:cNvSpPr>
+            <a:spLocks noGrp="1"/>
+          </p:cNvSpPr>
+          <p:nvPr>
+            <p:ph type="body" idx="1"/>
+          </p:nvPr>
+        </p:nvSpPr>
+        <p:spPr/>
+        <p:txBody>
+          <a:bodyPr/>
+          <a:lstStyle/>
+          <a:p>
+            <a:r>
+              <a:rPr lang="en-US" dirty="0"/>
+              <a:t>- did you ever had to add a common functionality between a set of endpoints?</a:t>
+            </a:r>
+          </a:p>
+          <a:p>
+            <a:r>
+              <a:rPr lang="en-US" dirty="0"/>
+              <a:t>- </a:t>
+            </a:r>
+            <a:r>
+              <a:rPr lang="en-US" dirty="0" err="1"/>
+              <a:t>.net</a:t>
+            </a:r>
+            <a:r>
+              <a:rPr lang="en-US" dirty="0"/>
+              <a:t> </a:t>
+            </a:r>
+            <a:r>
+              <a:rPr lang="en-US" dirty="0" err="1"/>
+              <a:t>middlewares</a:t>
+            </a:r>
+            <a:r>
+              <a:rPr lang="en-US" dirty="0"/>
+              <a:t> </a:t>
+            </a:r>
+          </a:p>
+          <a:p>
+            <a:r>
+              <a:rPr lang="en-US" dirty="0"/>
+              <a:t>- or decorator design pattern </a:t>
+            </a:r>
+          </a:p>
+          <a:p>
+            <a:r>
+              <a:rPr lang="en-US" dirty="0"/>
+              <a:t>- logging, gathering metrics, validation, </a:t>
+            </a:r>
+            <a:r>
+              <a:rPr lang="en-US" dirty="0" err="1"/>
+              <a:t>cacheing</a:t>
+            </a:r>
+            <a:r>
+              <a:rPr lang="en-US" dirty="0"/>
+              <a:t>?</a:t>
+            </a:r>
+          </a:p>
+        </p:txBody>
+      </p:sp>
+      <p:sp>
+        <p:nvSpPr>
+          <p:cNvPr id="4" name="Slide Number Placeholder 3"/>
+          <p:cNvSpPr>
+            <a:spLocks noGrp="1"/>
+          </p:cNvSpPr>
+          <p:nvPr>
+            <p:ph type="sldNum" sz="quarter" idx="5"/>
+          </p:nvPr>
+        </p:nvSpPr>
+        <p:spPr/>
+        <p:txBody>
+          <a:bodyPr/>
+          <a:lstStyle/>
+          <a:p>
+            <a:fld id="{50B2E8CF-7912-5344-9B14-D40B44999E4E}" type="slidenum">
+              <a:rPr lang="en-US" smtClean="0"/>
+              <a:t>16</a:t>
             </a:fld>
             <a:endParaRPr lang="en-US"/>
           </a:p>
@@ -6530,6 +6615,92 @@
           <a:p>
             <a:r>
               <a:rPr lang="en-GB" dirty="0"/>
+              <a:t>Pipeline Behaviour implementation</a:t>
+            </a:r>
+          </a:p>
+        </p:txBody>
+      </p:sp>
+      <p:sp>
+        <p:nvSpPr>
+          <p:cNvPr id="3" name="Text Placeholder 2">
+            <a:extLst>
+              <a:ext uri="{FF2B5EF4-FFF2-40B4-BE49-F238E27FC236}">
+                <a16:creationId xmlns:a16="http://schemas.microsoft.com/office/drawing/2014/main" id="{4FF1FDFA-D63C-40D4-9725-30BE387A6DFA}"/>
+              </a:ext>
+            </a:extLst>
+          </p:cNvPr>
+          <p:cNvSpPr>
+            <a:spLocks noGrp="1"/>
+          </p:cNvSpPr>
+          <p:nvPr>
+            <p:ph type="body" idx="1"/>
+          </p:nvPr>
+        </p:nvSpPr>
+        <p:spPr/>
+        <p:txBody>
+          <a:bodyPr/>
+          <a:lstStyle/>
+          <a:p>
+            <a:r>
+              <a:rPr lang="en-GB" dirty="0"/>
+              <a:t>Let’s jump into the code</a:t>
+            </a:r>
+          </a:p>
+        </p:txBody>
+      </p:sp>
+    </p:spTree>
+    <p:extLst>
+      <p:ext uri="{BB962C8B-B14F-4D97-AF65-F5344CB8AC3E}">
+        <p14:creationId xmlns:p14="http://schemas.microsoft.com/office/powerpoint/2010/main" val="2437674952"/>
+      </p:ext>
+    </p:extLst>
+  </p:cSld>
+  <p:clrMapOvr>
+    <a:masterClrMapping/>
+  </p:clrMapOvr>
+</p:sld>
+</file>
+
+<file path=ppt/slides/slide15.xml><?xml version="1.0" encoding="utf-8"?>
+<p:sld xmlns:a="http://schemas.openxmlformats.org/drawingml/2006/main" xmlns:r="http://schemas.openxmlformats.org/officeDocument/2006/relationships" xmlns:p="http://schemas.openxmlformats.org/presentationml/2006/main">
+  <p:cSld>
+    <p:spTree>
+      <p:nvGrpSpPr>
+        <p:cNvPr id="1" name=""/>
+        <p:cNvGrpSpPr/>
+        <p:nvPr/>
+      </p:nvGrpSpPr>
+      <p:grpSpPr>
+        <a:xfrm>
+          <a:off x="0" y="0"/>
+          <a:ext cx="0" cy="0"/>
+          <a:chOff x="0" y="0"/>
+          <a:chExt cx="0" cy="0"/>
+        </a:xfrm>
+      </p:grpSpPr>
+      <p:sp>
+        <p:nvSpPr>
+          <p:cNvPr id="2" name="Title 1">
+            <a:extLst>
+              <a:ext uri="{FF2B5EF4-FFF2-40B4-BE49-F238E27FC236}">
+                <a16:creationId xmlns:a16="http://schemas.microsoft.com/office/drawing/2014/main" id="{7B834A27-06C1-4E1E-80D9-0147BA9A1E46}"/>
+              </a:ext>
+            </a:extLst>
+          </p:cNvPr>
+          <p:cNvSpPr>
+            <a:spLocks noGrp="1"/>
+          </p:cNvSpPr>
+          <p:nvPr>
+            <p:ph type="title"/>
+          </p:nvPr>
+        </p:nvSpPr>
+        <p:spPr/>
+        <p:txBody>
+          <a:bodyPr/>
+          <a:lstStyle/>
+          <a:p>
+            <a:r>
+              <a:rPr lang="en-GB" dirty="0"/>
               <a:t>Speed and memory concerns</a:t>
             </a:r>
           </a:p>
@@ -6850,7 +7021,7 @@
 </p:sld>
 </file>
 
-<file path=ppt/slides/slide15.xml><?xml version="1.0" encoding="utf-8"?>
+<file path=ppt/slides/slide16.xml><?xml version="1.0" encoding="utf-8"?>
 <p:sld xmlns:a="http://schemas.openxmlformats.org/drawingml/2006/main" xmlns:r="http://schemas.openxmlformats.org/officeDocument/2006/relationships" xmlns:p="http://schemas.openxmlformats.org/presentationml/2006/main">
   <p:cSld>
     <p:spTree>
@@ -6944,7 +7115,7 @@
 </p:sld>
 </file>
 
-<file path=ppt/slides/slide16.xml><?xml version="1.0" encoding="utf-8"?>
+<file path=ppt/slides/slide17.xml><?xml version="1.0" encoding="utf-8"?>
 <p:sld xmlns:a="http://schemas.openxmlformats.org/drawingml/2006/main" xmlns:r="http://schemas.openxmlformats.org/officeDocument/2006/relationships" xmlns:p="http://schemas.openxmlformats.org/presentationml/2006/main">
   <p:cSld>
     <p:spTree>
@@ -8756,7 +8927,7 @@
           <a:p>
             <a:r>
               <a:rPr lang="en-GB" dirty="0"/>
-              <a:t>Problems with standard approach</a:t>
+              <a:t>Design Problems with standard approach</a:t>
             </a:r>
           </a:p>
         </p:txBody>

</xml_diff>